<commit_message>
the introduction is done! hurruh!
</commit_message>
<xml_diff>
--- a/presentation/tdd.pptx
+++ b/presentation/tdd.pptx
@@ -7,6 +7,7 @@
   <p:sldIdLst>
     <p:sldId id="256" r:id="rId2"/>
     <p:sldId id="257" r:id="rId3"/>
+    <p:sldId id="258" r:id="rId4"/>
   </p:sldIdLst>
   <p:sldSz cx="9144000" cy="6858000" type="screen4x3"/>
   <p:notesSz cx="6858000" cy="9144000"/>
@@ -289,6 +290,7 @@
           <a:p>
             <a:fld id="{DF9F1018-CB0B-CC43-9EE5-B0707BF90B94}" type="datetimeFigureOut">
               <a:rPr lang="en-US" smtClean="0"/>
+              <a:pPr/>
               <a:t>5/13/11</a:t>
             </a:fld>
             <a:endParaRPr lang="en-US"/>
@@ -331,6 +333,7 @@
           <a:p>
             <a:fld id="{7C897AF1-BE8D-0645-BDAF-71EBF1DF2452}" type="slidenum">
               <a:rPr lang="en-US" smtClean="0"/>
+              <a:pPr/>
               <a:t>‹#›</a:t>
             </a:fld>
             <a:endParaRPr lang="en-US"/>
@@ -454,6 +457,7 @@
           <a:p>
             <a:fld id="{DF9F1018-CB0B-CC43-9EE5-B0707BF90B94}" type="datetimeFigureOut">
               <a:rPr lang="en-US" smtClean="0"/>
+              <a:pPr/>
               <a:t>5/13/11</a:t>
             </a:fld>
             <a:endParaRPr lang="en-US"/>
@@ -496,6 +500,7 @@
           <a:p>
             <a:fld id="{7C897AF1-BE8D-0645-BDAF-71EBF1DF2452}" type="slidenum">
               <a:rPr lang="en-US" smtClean="0"/>
+              <a:pPr/>
               <a:t>‹#›</a:t>
             </a:fld>
             <a:endParaRPr lang="en-US"/>
@@ -629,6 +634,7 @@
           <a:p>
             <a:fld id="{DF9F1018-CB0B-CC43-9EE5-B0707BF90B94}" type="datetimeFigureOut">
               <a:rPr lang="en-US" smtClean="0"/>
+              <a:pPr/>
               <a:t>5/13/11</a:t>
             </a:fld>
             <a:endParaRPr lang="en-US"/>
@@ -671,6 +677,7 @@
           <a:p>
             <a:fld id="{7C897AF1-BE8D-0645-BDAF-71EBF1DF2452}" type="slidenum">
               <a:rPr lang="en-US" smtClean="0"/>
+              <a:pPr/>
               <a:t>‹#›</a:t>
             </a:fld>
             <a:endParaRPr lang="en-US"/>
@@ -794,6 +801,7 @@
           <a:p>
             <a:fld id="{DF9F1018-CB0B-CC43-9EE5-B0707BF90B94}" type="datetimeFigureOut">
               <a:rPr lang="en-US" smtClean="0"/>
+              <a:pPr/>
               <a:t>5/13/11</a:t>
             </a:fld>
             <a:endParaRPr lang="en-US"/>
@@ -836,6 +844,7 @@
           <a:p>
             <a:fld id="{7C897AF1-BE8D-0645-BDAF-71EBF1DF2452}" type="slidenum">
               <a:rPr lang="en-US" smtClean="0"/>
+              <a:pPr/>
               <a:t>‹#›</a:t>
             </a:fld>
             <a:endParaRPr lang="en-US"/>
@@ -1035,6 +1044,7 @@
           <a:p>
             <a:fld id="{DF9F1018-CB0B-CC43-9EE5-B0707BF90B94}" type="datetimeFigureOut">
               <a:rPr lang="en-US" smtClean="0"/>
+              <a:pPr/>
               <a:t>5/13/11</a:t>
             </a:fld>
             <a:endParaRPr lang="en-US"/>
@@ -1077,6 +1087,7 @@
           <a:p>
             <a:fld id="{7C897AF1-BE8D-0645-BDAF-71EBF1DF2452}" type="slidenum">
               <a:rPr lang="en-US" smtClean="0"/>
+              <a:pPr/>
               <a:t>‹#›</a:t>
             </a:fld>
             <a:endParaRPr lang="en-US"/>
@@ -1318,6 +1329,7 @@
           <a:p>
             <a:fld id="{DF9F1018-CB0B-CC43-9EE5-B0707BF90B94}" type="datetimeFigureOut">
               <a:rPr lang="en-US" smtClean="0"/>
+              <a:pPr/>
               <a:t>5/13/11</a:t>
             </a:fld>
             <a:endParaRPr lang="en-US"/>
@@ -1360,6 +1372,7 @@
           <a:p>
             <a:fld id="{7C897AF1-BE8D-0645-BDAF-71EBF1DF2452}" type="slidenum">
               <a:rPr lang="en-US" smtClean="0"/>
+              <a:pPr/>
               <a:t>‹#›</a:t>
             </a:fld>
             <a:endParaRPr lang="en-US"/>
@@ -1735,6 +1748,7 @@
           <a:p>
             <a:fld id="{DF9F1018-CB0B-CC43-9EE5-B0707BF90B94}" type="datetimeFigureOut">
               <a:rPr lang="en-US" smtClean="0"/>
+              <a:pPr/>
               <a:t>5/13/11</a:t>
             </a:fld>
             <a:endParaRPr lang="en-US"/>
@@ -1777,6 +1791,7 @@
           <a:p>
             <a:fld id="{7C897AF1-BE8D-0645-BDAF-71EBF1DF2452}" type="slidenum">
               <a:rPr lang="en-US" smtClean="0"/>
+              <a:pPr/>
               <a:t>‹#›</a:t>
             </a:fld>
             <a:endParaRPr lang="en-US"/>
@@ -1848,6 +1863,7 @@
           <a:p>
             <a:fld id="{DF9F1018-CB0B-CC43-9EE5-B0707BF90B94}" type="datetimeFigureOut">
               <a:rPr lang="en-US" smtClean="0"/>
+              <a:pPr/>
               <a:t>5/13/11</a:t>
             </a:fld>
             <a:endParaRPr lang="en-US"/>
@@ -1890,6 +1906,7 @@
           <a:p>
             <a:fld id="{7C897AF1-BE8D-0645-BDAF-71EBF1DF2452}" type="slidenum">
               <a:rPr lang="en-US" smtClean="0"/>
+              <a:pPr/>
               <a:t>‹#›</a:t>
             </a:fld>
             <a:endParaRPr lang="en-US"/>
@@ -1938,6 +1955,7 @@
           <a:p>
             <a:fld id="{DF9F1018-CB0B-CC43-9EE5-B0707BF90B94}" type="datetimeFigureOut">
               <a:rPr lang="en-US" smtClean="0"/>
+              <a:pPr/>
               <a:t>5/13/11</a:t>
             </a:fld>
             <a:endParaRPr lang="en-US"/>
@@ -1980,6 +1998,7 @@
           <a:p>
             <a:fld id="{7C897AF1-BE8D-0645-BDAF-71EBF1DF2452}" type="slidenum">
               <a:rPr lang="en-US" smtClean="0"/>
+              <a:pPr/>
               <a:t>‹#›</a:t>
             </a:fld>
             <a:endParaRPr lang="en-US"/>
@@ -2210,6 +2229,7 @@
           <a:p>
             <a:fld id="{DF9F1018-CB0B-CC43-9EE5-B0707BF90B94}" type="datetimeFigureOut">
               <a:rPr lang="en-US" smtClean="0"/>
+              <a:pPr/>
               <a:t>5/13/11</a:t>
             </a:fld>
             <a:endParaRPr lang="en-US"/>
@@ -2252,6 +2272,7 @@
           <a:p>
             <a:fld id="{7C897AF1-BE8D-0645-BDAF-71EBF1DF2452}" type="slidenum">
               <a:rPr lang="en-US" smtClean="0"/>
+              <a:pPr/>
               <a:t>‹#›</a:t>
             </a:fld>
             <a:endParaRPr lang="en-US"/>
@@ -2458,6 +2479,7 @@
           <a:p>
             <a:fld id="{DF9F1018-CB0B-CC43-9EE5-B0707BF90B94}" type="datetimeFigureOut">
               <a:rPr lang="en-US" smtClean="0"/>
+              <a:pPr/>
               <a:t>5/13/11</a:t>
             </a:fld>
             <a:endParaRPr lang="en-US"/>
@@ -2500,6 +2522,7 @@
           <a:p>
             <a:fld id="{7C897AF1-BE8D-0645-BDAF-71EBF1DF2452}" type="slidenum">
               <a:rPr lang="en-US" smtClean="0"/>
+              <a:pPr/>
               <a:t>‹#›</a:t>
             </a:fld>
             <a:endParaRPr lang="en-US"/>
@@ -2666,6 +2689,7 @@
           <a:p>
             <a:fld id="{DF9F1018-CB0B-CC43-9EE5-B0707BF90B94}" type="datetimeFigureOut">
               <a:rPr lang="en-US" smtClean="0"/>
+              <a:pPr/>
               <a:t>5/13/11</a:t>
             </a:fld>
             <a:endParaRPr lang="en-US"/>
@@ -2744,6 +2768,7 @@
           <a:p>
             <a:fld id="{7C897AF1-BE8D-0645-BDAF-71EBF1DF2452}" type="slidenum">
               <a:rPr lang="en-US" smtClean="0"/>
+              <a:pPr/>
               <a:t>‹#›</a:t>
             </a:fld>
             <a:endParaRPr lang="en-US"/>
@@ -3094,6 +3119,69 @@
         <p:spPr>
           <a:xfrm>
             <a:off x="1107212" y="2551057"/>
+            <a:ext cx="2491300" cy="369332"/>
+          </a:xfrm>
+          <a:prstGeom prst="rect">
+            <a:avLst/>
+          </a:prstGeom>
+          <a:noFill/>
+        </p:spPr>
+        <p:txBody>
+          <a:bodyPr wrap="none" rtlCol="0">
+            <a:spAutoFit/>
+          </a:bodyPr>
+          <a:lstStyle/>
+          <a:p>
+            <a:r>
+              <a:rPr lang="en-US" dirty="0" smtClean="0"/>
+              <a:t>Insert</a:t>
+            </a:r>
+            <a:r>
+              <a:rPr lang="en-US" dirty="0" smtClean="0"/>
+              <a:t> picture of </a:t>
+            </a:r>
+            <a:r>
+              <a:rPr lang="en-US" dirty="0" err="1" smtClean="0"/>
+              <a:t>johnson</a:t>
+            </a:r>
+            <a:endParaRPr lang="en-US" dirty="0" smtClean="0"/>
+          </a:p>
+        </p:txBody>
+      </p:sp>
+    </p:spTree>
+  </p:cSld>
+  <p:clrMapOvr>
+    <a:masterClrMapping/>
+  </p:clrMapOvr>
+</p:sld>
+</file>
+
+<file path=ppt/slides/slide3.xml><?xml version="1.0" encoding="utf-8"?>
+<p:sld xmlns:a="http://schemas.openxmlformats.org/drawingml/2006/main" xmlns:r="http://schemas.openxmlformats.org/officeDocument/2006/relationships" xmlns:mc="http://schemas.openxmlformats.org/markup-compatibility/2006" xmlns:mv="urn:schemas-microsoft-com:mac:vml" xmlns:p="http://schemas.openxmlformats.org/presentationml/2006/main" mc:Ignorable="mv" mc:PreserveAttributes="mv:*">
+  <p:cSld>
+    <p:spTree>
+      <p:nvGrpSpPr>
+        <p:cNvPr id="1" name=""/>
+        <p:cNvGrpSpPr/>
+        <p:nvPr/>
+      </p:nvGrpSpPr>
+      <p:grpSpPr>
+        <a:xfrm>
+          <a:off x="0" y="0"/>
+          <a:ext cx="0" cy="0"/>
+          <a:chOff x="0" y="0"/>
+          <a:chExt cx="0" cy="0"/>
+        </a:xfrm>
+      </p:grpSpPr>
+      <p:sp>
+        <p:nvSpPr>
+          <p:cNvPr id="4" name="TextBox 3"/>
+          <p:cNvSpPr txBox="1"/>
+          <p:nvPr/>
+        </p:nvSpPr>
+        <p:spPr>
+          <a:xfrm>
+            <a:off x="1107212" y="2551057"/>
             <a:ext cx="2702520" cy="369332"/>
           </a:xfrm>
           <a:prstGeom prst="rect">

</xml_diff>

<commit_message>
added diagram of model of code
</commit_message>
<xml_diff>
--- a/presentation/tdd.pptx
+++ b/presentation/tdd.pptx
@@ -7,7 +7,8 @@
   <p:sldIdLst>
     <p:sldId id="256" r:id="rId2"/>
     <p:sldId id="257" r:id="rId3"/>
-    <p:sldId id="258" r:id="rId4"/>
+    <p:sldId id="259" r:id="rId4"/>
+    <p:sldId id="258" r:id="rId5"/>
   </p:sldIdLst>
   <p:sldSz cx="9144000" cy="6858000" type="screen4x3"/>
   <p:notesSz cx="6858000" cy="9144000"/>
@@ -3157,6 +3158,734 @@
 </file>
 
 <file path=ppt/slides/slide3.xml><?xml version="1.0" encoding="utf-8"?>
+<p:sld xmlns:a="http://schemas.openxmlformats.org/drawingml/2006/main" xmlns:r="http://schemas.openxmlformats.org/officeDocument/2006/relationships" xmlns:mc="http://schemas.openxmlformats.org/markup-compatibility/2006" xmlns:mv="urn:schemas-microsoft-com:mac:vml" xmlns:p="http://schemas.openxmlformats.org/presentationml/2006/main" mc:Ignorable="mv" mc:PreserveAttributes="mv:*">
+  <p:cSld>
+    <p:spTree>
+      <p:nvGrpSpPr>
+        <p:cNvPr id="1" name=""/>
+        <p:cNvGrpSpPr/>
+        <p:nvPr/>
+      </p:nvGrpSpPr>
+      <p:grpSpPr>
+        <a:xfrm>
+          <a:off x="0" y="0"/>
+          <a:ext cx="0" cy="0"/>
+          <a:chOff x="0" y="0"/>
+          <a:chExt cx="0" cy="0"/>
+        </a:xfrm>
+      </p:grpSpPr>
+      <p:sp>
+        <p:nvSpPr>
+          <p:cNvPr id="3" name="Rectangle 2"/>
+          <p:cNvSpPr/>
+          <p:nvPr/>
+        </p:nvSpPr>
+        <p:spPr>
+          <a:xfrm>
+            <a:off x="1856209" y="1335234"/>
+            <a:ext cx="1964759" cy="564489"/>
+          </a:xfrm>
+          <a:prstGeom prst="rect">
+            <a:avLst/>
+          </a:prstGeom>
+        </p:spPr>
+        <p:style>
+          <a:lnRef idx="1">
+            <a:schemeClr val="accent1"/>
+          </a:lnRef>
+          <a:fillRef idx="3">
+            <a:schemeClr val="accent1"/>
+          </a:fillRef>
+          <a:effectRef idx="2">
+            <a:schemeClr val="accent1"/>
+          </a:effectRef>
+          <a:fontRef idx="minor">
+            <a:schemeClr val="lt1"/>
+          </a:fontRef>
+        </p:style>
+        <p:txBody>
+          <a:bodyPr rtlCol="0" anchor="ctr">
+            <a:normAutofit/>
+          </a:bodyPr>
+          <a:lstStyle/>
+          <a:p>
+            <a:pPr algn="ctr"/>
+            <a:r>
+              <a:rPr lang="en-US" dirty="0" err="1" smtClean="0"/>
+              <a:t>JohnsonsSystem</a:t>
+            </a:r>
+            <a:endParaRPr lang="en-US" dirty="0"/>
+          </a:p>
+        </p:txBody>
+      </p:sp>
+      <p:sp>
+        <p:nvSpPr>
+          <p:cNvPr id="5" name="Rectangle 4"/>
+          <p:cNvSpPr/>
+          <p:nvPr/>
+        </p:nvSpPr>
+        <p:spPr>
+          <a:xfrm>
+            <a:off x="3973368" y="4582313"/>
+            <a:ext cx="1964759" cy="564489"/>
+          </a:xfrm>
+          <a:prstGeom prst="rect">
+            <a:avLst/>
+          </a:prstGeom>
+        </p:spPr>
+        <p:style>
+          <a:lnRef idx="1">
+            <a:schemeClr val="accent1"/>
+          </a:lnRef>
+          <a:fillRef idx="3">
+            <a:schemeClr val="accent1"/>
+          </a:fillRef>
+          <a:effectRef idx="2">
+            <a:schemeClr val="accent1"/>
+          </a:effectRef>
+          <a:fontRef idx="minor">
+            <a:schemeClr val="lt1"/>
+          </a:fontRef>
+        </p:style>
+        <p:txBody>
+          <a:bodyPr rtlCol="0" anchor="ctr">
+            <a:normAutofit/>
+          </a:bodyPr>
+          <a:lstStyle/>
+          <a:p>
+            <a:pPr algn="ctr"/>
+            <a:r>
+              <a:rPr lang="en-US" dirty="0" smtClean="0"/>
+              <a:t>Account</a:t>
+            </a:r>
+            <a:endParaRPr lang="en-US" dirty="0"/>
+          </a:p>
+        </p:txBody>
+      </p:sp>
+      <p:sp>
+        <p:nvSpPr>
+          <p:cNvPr id="6" name="Rectangle 5"/>
+          <p:cNvSpPr/>
+          <p:nvPr/>
+        </p:nvSpPr>
+        <p:spPr>
+          <a:xfrm>
+            <a:off x="6524728" y="3549767"/>
+            <a:ext cx="1964759" cy="564489"/>
+          </a:xfrm>
+          <a:prstGeom prst="rect">
+            <a:avLst/>
+          </a:prstGeom>
+        </p:spPr>
+        <p:style>
+          <a:lnRef idx="1">
+            <a:schemeClr val="accent1"/>
+          </a:lnRef>
+          <a:fillRef idx="3">
+            <a:schemeClr val="accent1"/>
+          </a:fillRef>
+          <a:effectRef idx="2">
+            <a:schemeClr val="accent1"/>
+          </a:effectRef>
+          <a:fontRef idx="minor">
+            <a:schemeClr val="lt1"/>
+          </a:fontRef>
+        </p:style>
+        <p:txBody>
+          <a:bodyPr rtlCol="0" anchor="ctr">
+            <a:normAutofit/>
+          </a:bodyPr>
+          <a:lstStyle/>
+          <a:p>
+            <a:pPr algn="ctr"/>
+            <a:r>
+              <a:rPr lang="en-US" dirty="0" smtClean="0"/>
+              <a:t>Receipt</a:t>
+            </a:r>
+          </a:p>
+        </p:txBody>
+      </p:sp>
+      <p:sp>
+        <p:nvSpPr>
+          <p:cNvPr id="7" name="Rectangle 6"/>
+          <p:cNvSpPr/>
+          <p:nvPr/>
+        </p:nvSpPr>
+        <p:spPr>
+          <a:xfrm>
+            <a:off x="4803347" y="5906690"/>
+            <a:ext cx="1964759" cy="564489"/>
+          </a:xfrm>
+          <a:prstGeom prst="rect">
+            <a:avLst/>
+          </a:prstGeom>
+        </p:spPr>
+        <p:style>
+          <a:lnRef idx="1">
+            <a:schemeClr val="accent1"/>
+          </a:lnRef>
+          <a:fillRef idx="3">
+            <a:schemeClr val="accent1"/>
+          </a:fillRef>
+          <a:effectRef idx="2">
+            <a:schemeClr val="accent1"/>
+          </a:effectRef>
+          <a:fontRef idx="minor">
+            <a:schemeClr val="lt1"/>
+          </a:fontRef>
+        </p:style>
+        <p:txBody>
+          <a:bodyPr rtlCol="0" anchor="ctr">
+            <a:normAutofit/>
+          </a:bodyPr>
+          <a:lstStyle/>
+          <a:p>
+            <a:pPr algn="ctr"/>
+            <a:r>
+              <a:rPr lang="en-US" dirty="0" smtClean="0"/>
+              <a:t>Money</a:t>
+            </a:r>
+            <a:endParaRPr lang="en-US" dirty="0"/>
+          </a:p>
+        </p:txBody>
+      </p:sp>
+      <p:sp>
+        <p:nvSpPr>
+          <p:cNvPr id="8" name="Rectangle 7"/>
+          <p:cNvSpPr/>
+          <p:nvPr/>
+        </p:nvSpPr>
+        <p:spPr>
+          <a:xfrm>
+            <a:off x="348649" y="4300068"/>
+            <a:ext cx="1964759" cy="564489"/>
+          </a:xfrm>
+          <a:prstGeom prst="rect">
+            <a:avLst/>
+          </a:prstGeom>
+        </p:spPr>
+        <p:style>
+          <a:lnRef idx="1">
+            <a:schemeClr val="accent1"/>
+          </a:lnRef>
+          <a:fillRef idx="3">
+            <a:schemeClr val="accent1"/>
+          </a:fillRef>
+          <a:effectRef idx="2">
+            <a:schemeClr val="accent1"/>
+          </a:effectRef>
+          <a:fontRef idx="minor">
+            <a:schemeClr val="lt1"/>
+          </a:fontRef>
+        </p:style>
+        <p:txBody>
+          <a:bodyPr rtlCol="0" anchor="ctr">
+            <a:normAutofit/>
+          </a:bodyPr>
+          <a:lstStyle/>
+          <a:p>
+            <a:pPr algn="ctr"/>
+            <a:r>
+              <a:rPr lang="en-US" dirty="0" err="1" smtClean="0"/>
+              <a:t>AccountReference</a:t>
+            </a:r>
+            <a:endParaRPr lang="en-US" dirty="0"/>
+          </a:p>
+        </p:txBody>
+      </p:sp>
+      <p:sp>
+        <p:nvSpPr>
+          <p:cNvPr id="9" name="Rectangle 8"/>
+          <p:cNvSpPr/>
+          <p:nvPr/>
+        </p:nvSpPr>
+        <p:spPr>
+          <a:xfrm>
+            <a:off x="548180" y="5613955"/>
+            <a:ext cx="1964759" cy="564489"/>
+          </a:xfrm>
+          <a:prstGeom prst="rect">
+            <a:avLst/>
+          </a:prstGeom>
+        </p:spPr>
+        <p:style>
+          <a:lnRef idx="1">
+            <a:schemeClr val="accent1"/>
+          </a:lnRef>
+          <a:fillRef idx="3">
+            <a:schemeClr val="accent1"/>
+          </a:fillRef>
+          <a:effectRef idx="2">
+            <a:schemeClr val="accent1"/>
+          </a:effectRef>
+          <a:fontRef idx="minor">
+            <a:schemeClr val="lt1"/>
+          </a:fontRef>
+        </p:style>
+        <p:txBody>
+          <a:bodyPr rtlCol="0" anchor="ctr">
+            <a:normAutofit/>
+          </a:bodyPr>
+          <a:lstStyle/>
+          <a:p>
+            <a:pPr algn="ctr"/>
+            <a:r>
+              <a:rPr lang="en-US" dirty="0" err="1" smtClean="0"/>
+              <a:t>SystemClock</a:t>
+            </a:r>
+            <a:endParaRPr lang="en-US" dirty="0"/>
+          </a:p>
+        </p:txBody>
+      </p:sp>
+      <p:sp>
+        <p:nvSpPr>
+          <p:cNvPr id="10" name="Rectangle 9"/>
+          <p:cNvSpPr/>
+          <p:nvPr/>
+        </p:nvSpPr>
+        <p:spPr>
+          <a:xfrm>
+            <a:off x="2990990" y="2703034"/>
+            <a:ext cx="1964759" cy="564489"/>
+          </a:xfrm>
+          <a:prstGeom prst="rect">
+            <a:avLst/>
+          </a:prstGeom>
+        </p:spPr>
+        <p:style>
+          <a:lnRef idx="1">
+            <a:schemeClr val="accent1"/>
+          </a:lnRef>
+          <a:fillRef idx="3">
+            <a:schemeClr val="accent1"/>
+          </a:fillRef>
+          <a:effectRef idx="2">
+            <a:schemeClr val="accent1"/>
+          </a:effectRef>
+          <a:fontRef idx="minor">
+            <a:schemeClr val="lt1"/>
+          </a:fontRef>
+        </p:style>
+        <p:txBody>
+          <a:bodyPr rtlCol="0" anchor="ctr">
+            <a:normAutofit/>
+          </a:bodyPr>
+          <a:lstStyle/>
+          <a:p>
+            <a:pPr algn="ctr"/>
+            <a:r>
+              <a:rPr lang="en-US" dirty="0" smtClean="0"/>
+              <a:t>Teller</a:t>
+            </a:r>
+            <a:endParaRPr lang="en-US" dirty="0"/>
+          </a:p>
+        </p:txBody>
+      </p:sp>
+      <p:cxnSp>
+        <p:nvCxnSpPr>
+          <p:cNvPr id="12" name="Straight Arrow Connector 11"/>
+          <p:cNvCxnSpPr>
+            <a:stCxn id="3" idx="2"/>
+            <a:endCxn id="10" idx="0"/>
+          </p:cNvCxnSpPr>
+          <p:nvPr/>
+        </p:nvCxnSpPr>
+        <p:spPr>
+          <a:xfrm rot="16200000" flipH="1">
+            <a:off x="3004324" y="1733987"/>
+            <a:ext cx="803311" cy="1134781"/>
+          </a:xfrm>
+          <a:prstGeom prst="straightConnector1">
+            <a:avLst/>
+          </a:prstGeom>
+          <a:ln>
+            <a:tailEnd type="arrow"/>
+          </a:ln>
+        </p:spPr>
+        <p:style>
+          <a:lnRef idx="2">
+            <a:schemeClr val="accent1"/>
+          </a:lnRef>
+          <a:fillRef idx="0">
+            <a:schemeClr val="accent1"/>
+          </a:fillRef>
+          <a:effectRef idx="1">
+            <a:schemeClr val="accent1"/>
+          </a:effectRef>
+          <a:fontRef idx="minor">
+            <a:schemeClr val="tx1"/>
+          </a:fontRef>
+        </p:style>
+      </p:cxnSp>
+      <p:cxnSp>
+        <p:nvCxnSpPr>
+          <p:cNvPr id="14" name="Straight Arrow Connector 13"/>
+          <p:cNvCxnSpPr>
+            <a:stCxn id="10" idx="2"/>
+            <a:endCxn id="5" idx="0"/>
+          </p:cNvCxnSpPr>
+          <p:nvPr/>
+        </p:nvCxnSpPr>
+        <p:spPr>
+          <a:xfrm rot="16200000" flipH="1">
+            <a:off x="3807164" y="3433729"/>
+            <a:ext cx="1314790" cy="982378"/>
+          </a:xfrm>
+          <a:prstGeom prst="straightConnector1">
+            <a:avLst/>
+          </a:prstGeom>
+          <a:ln>
+            <a:tailEnd type="arrow"/>
+          </a:ln>
+        </p:spPr>
+        <p:style>
+          <a:lnRef idx="2">
+            <a:schemeClr val="accent1"/>
+          </a:lnRef>
+          <a:fillRef idx="0">
+            <a:schemeClr val="accent1"/>
+          </a:fillRef>
+          <a:effectRef idx="1">
+            <a:schemeClr val="accent1"/>
+          </a:effectRef>
+          <a:fontRef idx="minor">
+            <a:schemeClr val="tx1"/>
+          </a:fontRef>
+        </p:style>
+      </p:cxnSp>
+      <p:cxnSp>
+        <p:nvCxnSpPr>
+          <p:cNvPr id="16" name="Straight Arrow Connector 15"/>
+          <p:cNvCxnSpPr>
+            <a:stCxn id="5" idx="1"/>
+            <a:endCxn id="8" idx="3"/>
+          </p:cNvCxnSpPr>
+          <p:nvPr/>
+        </p:nvCxnSpPr>
+        <p:spPr>
+          <a:xfrm rot="10800000">
+            <a:off x="2313408" y="4582314"/>
+            <a:ext cx="1659960" cy="282245"/>
+          </a:xfrm>
+          <a:prstGeom prst="straightConnector1">
+            <a:avLst/>
+          </a:prstGeom>
+          <a:ln>
+            <a:tailEnd type="arrow"/>
+          </a:ln>
+        </p:spPr>
+        <p:style>
+          <a:lnRef idx="2">
+            <a:schemeClr val="accent1"/>
+          </a:lnRef>
+          <a:fillRef idx="0">
+            <a:schemeClr val="accent1"/>
+          </a:fillRef>
+          <a:effectRef idx="1">
+            <a:schemeClr val="accent1"/>
+          </a:effectRef>
+          <a:fontRef idx="minor">
+            <a:schemeClr val="tx1"/>
+          </a:fontRef>
+        </p:style>
+      </p:cxnSp>
+      <p:cxnSp>
+        <p:nvCxnSpPr>
+          <p:cNvPr id="18" name="Straight Arrow Connector 17"/>
+          <p:cNvCxnSpPr>
+            <a:stCxn id="5" idx="3"/>
+            <a:endCxn id="6" idx="2"/>
+          </p:cNvCxnSpPr>
+          <p:nvPr/>
+        </p:nvCxnSpPr>
+        <p:spPr>
+          <a:xfrm flipV="1">
+            <a:off x="5938127" y="4114256"/>
+            <a:ext cx="1568981" cy="750302"/>
+          </a:xfrm>
+          <a:prstGeom prst="straightConnector1">
+            <a:avLst/>
+          </a:prstGeom>
+          <a:ln>
+            <a:tailEnd type="arrow"/>
+          </a:ln>
+        </p:spPr>
+        <p:style>
+          <a:lnRef idx="2">
+            <a:schemeClr val="accent1"/>
+          </a:lnRef>
+          <a:fillRef idx="0">
+            <a:schemeClr val="accent1"/>
+          </a:fillRef>
+          <a:effectRef idx="1">
+            <a:schemeClr val="accent1"/>
+          </a:effectRef>
+          <a:fontRef idx="minor">
+            <a:schemeClr val="tx1"/>
+          </a:fontRef>
+        </p:style>
+      </p:cxnSp>
+      <p:cxnSp>
+        <p:nvCxnSpPr>
+          <p:cNvPr id="20" name="Straight Arrow Connector 19"/>
+          <p:cNvCxnSpPr>
+            <a:stCxn id="5" idx="2"/>
+            <a:endCxn id="7" idx="0"/>
+          </p:cNvCxnSpPr>
+          <p:nvPr/>
+        </p:nvCxnSpPr>
+        <p:spPr>
+          <a:xfrm rot="16200000" flipH="1">
+            <a:off x="4990793" y="5111756"/>
+            <a:ext cx="759888" cy="829979"/>
+          </a:xfrm>
+          <a:prstGeom prst="straightConnector1">
+            <a:avLst/>
+          </a:prstGeom>
+          <a:ln>
+            <a:tailEnd type="arrow"/>
+          </a:ln>
+        </p:spPr>
+        <p:style>
+          <a:lnRef idx="2">
+            <a:schemeClr val="accent1"/>
+          </a:lnRef>
+          <a:fillRef idx="0">
+            <a:schemeClr val="accent1"/>
+          </a:fillRef>
+          <a:effectRef idx="1">
+            <a:schemeClr val="accent1"/>
+          </a:effectRef>
+          <a:fontRef idx="minor">
+            <a:schemeClr val="tx1"/>
+          </a:fontRef>
+        </p:style>
+      </p:cxnSp>
+      <p:cxnSp>
+        <p:nvCxnSpPr>
+          <p:cNvPr id="24" name="Straight Arrow Connector 23"/>
+          <p:cNvCxnSpPr>
+            <a:stCxn id="5" idx="2"/>
+            <a:endCxn id="9" idx="3"/>
+          </p:cNvCxnSpPr>
+          <p:nvPr/>
+        </p:nvCxnSpPr>
+        <p:spPr>
+          <a:xfrm rot="5400000">
+            <a:off x="3359645" y="4300097"/>
+            <a:ext cx="749398" cy="2442809"/>
+          </a:xfrm>
+          <a:prstGeom prst="straightConnector1">
+            <a:avLst/>
+          </a:prstGeom>
+          <a:ln>
+            <a:tailEnd type="arrow"/>
+          </a:ln>
+        </p:spPr>
+        <p:style>
+          <a:lnRef idx="2">
+            <a:schemeClr val="accent1"/>
+          </a:lnRef>
+          <a:fillRef idx="0">
+            <a:schemeClr val="accent1"/>
+          </a:fillRef>
+          <a:effectRef idx="1">
+            <a:schemeClr val="accent1"/>
+          </a:effectRef>
+          <a:fontRef idx="minor">
+            <a:schemeClr val="tx1"/>
+          </a:fontRef>
+        </p:style>
+      </p:cxnSp>
+      <p:sp>
+        <p:nvSpPr>
+          <p:cNvPr id="27" name="TextBox 26"/>
+          <p:cNvSpPr txBox="1"/>
+          <p:nvPr/>
+        </p:nvSpPr>
+        <p:spPr>
+          <a:xfrm>
+            <a:off x="3560448" y="2149401"/>
+            <a:ext cx="506794" cy="369332"/>
+          </a:xfrm>
+          <a:prstGeom prst="rect">
+            <a:avLst/>
+          </a:prstGeom>
+          <a:noFill/>
+        </p:spPr>
+        <p:txBody>
+          <a:bodyPr wrap="none" rtlCol="0">
+            <a:spAutoFit/>
+          </a:bodyPr>
+          <a:lstStyle/>
+          <a:p>
+            <a:r>
+              <a:rPr lang="en-US" dirty="0" smtClean="0"/>
+              <a:t>has</a:t>
+            </a:r>
+            <a:endParaRPr lang="en-US" dirty="0"/>
+          </a:p>
+        </p:txBody>
+      </p:sp>
+      <p:sp>
+        <p:nvSpPr>
+          <p:cNvPr id="28" name="TextBox 27"/>
+          <p:cNvSpPr txBox="1"/>
+          <p:nvPr/>
+        </p:nvSpPr>
+        <p:spPr>
+          <a:xfrm>
+            <a:off x="4635095" y="3766879"/>
+            <a:ext cx="864339" cy="369332"/>
+          </a:xfrm>
+          <a:prstGeom prst="rect">
+            <a:avLst/>
+          </a:prstGeom>
+          <a:noFill/>
+        </p:spPr>
+        <p:txBody>
+          <a:bodyPr wrap="none" rtlCol="0">
+            <a:spAutoFit/>
+          </a:bodyPr>
+          <a:lstStyle/>
+          <a:p>
+            <a:r>
+              <a:rPr lang="en-US" dirty="0" smtClean="0"/>
+              <a:t>creates</a:t>
+            </a:r>
+            <a:endParaRPr lang="en-US" dirty="0"/>
+          </a:p>
+        </p:txBody>
+      </p:sp>
+      <p:sp>
+        <p:nvSpPr>
+          <p:cNvPr id="29" name="TextBox 28"/>
+          <p:cNvSpPr txBox="1"/>
+          <p:nvPr/>
+        </p:nvSpPr>
+        <p:spPr>
+          <a:xfrm>
+            <a:off x="7077475" y="4582314"/>
+            <a:ext cx="864339" cy="369332"/>
+          </a:xfrm>
+          <a:prstGeom prst="rect">
+            <a:avLst/>
+          </a:prstGeom>
+          <a:noFill/>
+        </p:spPr>
+        <p:txBody>
+          <a:bodyPr wrap="none" rtlCol="0">
+            <a:spAutoFit/>
+          </a:bodyPr>
+          <a:lstStyle/>
+          <a:p>
+            <a:r>
+              <a:rPr lang="en-US" dirty="0" smtClean="0"/>
+              <a:t>creates</a:t>
+            </a:r>
+            <a:endParaRPr lang="en-US" dirty="0"/>
+          </a:p>
+        </p:txBody>
+      </p:sp>
+      <p:sp>
+        <p:nvSpPr>
+          <p:cNvPr id="30" name="TextBox 29"/>
+          <p:cNvSpPr txBox="1"/>
+          <p:nvPr/>
+        </p:nvSpPr>
+        <p:spPr>
+          <a:xfrm>
+            <a:off x="5799409" y="5439780"/>
+            <a:ext cx="1450638" cy="369332"/>
+          </a:xfrm>
+          <a:prstGeom prst="rect">
+            <a:avLst/>
+          </a:prstGeom>
+          <a:noFill/>
+        </p:spPr>
+        <p:txBody>
+          <a:bodyPr wrap="none" rtlCol="0">
+            <a:spAutoFit/>
+          </a:bodyPr>
+          <a:lstStyle/>
+          <a:p>
+            <a:r>
+              <a:rPr lang="en-US" dirty="0" smtClean="0"/>
+              <a:t>has (balance)</a:t>
+            </a:r>
+            <a:endParaRPr lang="en-US" dirty="0"/>
+          </a:p>
+        </p:txBody>
+      </p:sp>
+      <p:sp>
+        <p:nvSpPr>
+          <p:cNvPr id="31" name="TextBox 30"/>
+          <p:cNvSpPr txBox="1"/>
+          <p:nvPr/>
+        </p:nvSpPr>
+        <p:spPr>
+          <a:xfrm>
+            <a:off x="2838589" y="5809112"/>
+            <a:ext cx="787395" cy="369332"/>
+          </a:xfrm>
+          <a:prstGeom prst="rect">
+            <a:avLst/>
+          </a:prstGeom>
+          <a:noFill/>
+        </p:spPr>
+        <p:txBody>
+          <a:bodyPr wrap="none" rtlCol="0">
+            <a:spAutoFit/>
+          </a:bodyPr>
+          <a:lstStyle/>
+          <a:p>
+            <a:r>
+              <a:rPr lang="en-US" dirty="0" smtClean="0"/>
+              <a:t>knows</a:t>
+            </a:r>
+            <a:endParaRPr lang="en-US" dirty="0"/>
+          </a:p>
+        </p:txBody>
+      </p:sp>
+      <p:sp>
+        <p:nvSpPr>
+          <p:cNvPr id="32" name="TextBox 31"/>
+          <p:cNvSpPr txBox="1"/>
+          <p:nvPr/>
+        </p:nvSpPr>
+        <p:spPr>
+          <a:xfrm>
+            <a:off x="2838589" y="4300068"/>
+            <a:ext cx="506794" cy="369332"/>
+          </a:xfrm>
+          <a:prstGeom prst="rect">
+            <a:avLst/>
+          </a:prstGeom>
+          <a:noFill/>
+        </p:spPr>
+        <p:txBody>
+          <a:bodyPr wrap="none" rtlCol="0">
+            <a:spAutoFit/>
+          </a:bodyPr>
+          <a:lstStyle/>
+          <a:p>
+            <a:r>
+              <a:rPr lang="en-US" dirty="0" smtClean="0"/>
+              <a:t>has</a:t>
+            </a:r>
+            <a:endParaRPr lang="en-US" dirty="0"/>
+          </a:p>
+        </p:txBody>
+      </p:sp>
+    </p:spTree>
+  </p:cSld>
+  <p:clrMapOvr>
+    <a:masterClrMapping/>
+  </p:clrMapOvr>
+</p:sld>
+</file>
+
+<file path=ppt/slides/slide4.xml><?xml version="1.0" encoding="utf-8"?>
 <p:sld xmlns:a="http://schemas.openxmlformats.org/drawingml/2006/main" xmlns:r="http://schemas.openxmlformats.org/officeDocument/2006/relationships" xmlns:mc="http://schemas.openxmlformats.org/markup-compatibility/2006" xmlns:mv="urn:schemas-microsoft-com:mac:vml" xmlns:p="http://schemas.openxmlformats.org/presentationml/2006/main" mc:Ignorable="mv" mc:PreserveAttributes="mv:*">
   <p:cSld>
     <p:spTree>

</xml_diff>